<commit_message>
update readme -update presentation -add pdf report -update match api calls
</commit_message>
<xml_diff>
--- a/Documentation/Bluff game.pptx
+++ b/Documentation/Bluff game.pptx
@@ -5,10 +5,10 @@
     <p:sldMasterId id="2147483660" r:id="rId4"/>
   </p:sldMasterIdLst>
   <p:notesMasterIdLst>
-    <p:notesMasterId r:id="rId19"/>
+    <p:notesMasterId r:id="rId25"/>
   </p:notesMasterIdLst>
   <p:handoutMasterIdLst>
-    <p:handoutMasterId r:id="rId20"/>
+    <p:handoutMasterId r:id="rId26"/>
   </p:handoutMasterIdLst>
   <p:sldIdLst>
     <p:sldId id="257" r:id="rId5"/>
@@ -24,7 +24,13 @@
     <p:sldId id="265" r:id="rId15"/>
     <p:sldId id="278" r:id="rId16"/>
     <p:sldId id="263" r:id="rId17"/>
-    <p:sldId id="271" r:id="rId18"/>
+    <p:sldId id="279" r:id="rId18"/>
+    <p:sldId id="281" r:id="rId19"/>
+    <p:sldId id="282" r:id="rId20"/>
+    <p:sldId id="283" r:id="rId21"/>
+    <p:sldId id="284" r:id="rId22"/>
+    <p:sldId id="285" r:id="rId23"/>
+    <p:sldId id="271" r:id="rId24"/>
   </p:sldIdLst>
   <p:sldSz cx="12188825" cy="6858000"/>
   <p:notesSz cx="6858000" cy="9144000"/>
@@ -337,7 +343,7 @@
           <a:p>
             <a:fld id="{FE5B4EDC-59C0-49C7-8ADA-5A781B329E02}" type="datetimeFigureOut">
               <a:rPr lang="en-US"/>
-              <a:t>5/8/2025</a:t>
+              <a:t>5/9/2025</a:t>
             </a:fld>
             <a:endParaRPr/>
           </a:p>
@@ -502,7 +508,7 @@
           <a:p>
             <a:fld id="{F2D8D46A-B586-417D-BFBD-8C8FE0AAF762}" type="datetimeFigureOut">
               <a:rPr lang="en-US"/>
-              <a:t>5/8/2025</a:t>
+              <a:t>5/9/2025</a:t>
             </a:fld>
             <a:endParaRPr/>
           </a:p>
@@ -1520,7 +1526,7 @@
           <a:p>
             <a:fld id="{F0DFD029-FB74-4578-B929-F66AA97659CA}" type="datetimeFigureOut">
               <a:rPr lang="en-US"/>
-              <a:t>5/8/2025</a:t>
+              <a:t>5/9/2025</a:t>
             </a:fld>
             <a:endParaRPr/>
           </a:p>
@@ -1718,7 +1724,7 @@
           <a:p>
             <a:fld id="{F0DFD029-FB74-4578-B929-F66AA97659CA}" type="datetimeFigureOut">
               <a:rPr lang="en-US"/>
-              <a:t>5/8/2025</a:t>
+              <a:t>5/9/2025</a:t>
             </a:fld>
             <a:endParaRPr/>
           </a:p>
@@ -1926,7 +1932,7 @@
           <a:p>
             <a:fld id="{F0DFD029-FB74-4578-B929-F66AA97659CA}" type="datetimeFigureOut">
               <a:rPr lang="en-US"/>
-              <a:t>5/8/2025</a:t>
+              <a:t>5/9/2025</a:t>
             </a:fld>
             <a:endParaRPr/>
           </a:p>
@@ -2124,7 +2130,7 @@
           <a:p>
             <a:fld id="{F0DFD029-FB74-4578-B929-F66AA97659CA}" type="datetimeFigureOut">
               <a:rPr lang="en-US"/>
-              <a:t>5/8/2025</a:t>
+              <a:t>5/9/2025</a:t>
             </a:fld>
             <a:endParaRPr/>
           </a:p>
@@ -2556,7 +2562,7 @@
           <a:p>
             <a:fld id="{F0DFD029-FB74-4578-B929-F66AA97659CA}" type="datetimeFigureOut">
               <a:rPr lang="en-US"/>
-              <a:t>5/8/2025</a:t>
+              <a:t>5/9/2025</a:t>
             </a:fld>
             <a:endParaRPr/>
           </a:p>
@@ -2860,7 +2866,7 @@
           <a:p>
             <a:fld id="{F0DFD029-FB74-4578-B929-F66AA97659CA}" type="datetimeFigureOut">
               <a:rPr lang="en-US"/>
-              <a:t>5/8/2025</a:t>
+              <a:t>5/9/2025</a:t>
             </a:fld>
             <a:endParaRPr/>
           </a:p>
@@ -3316,7 +3322,7 @@
           <a:p>
             <a:fld id="{F0DFD029-FB74-4578-B929-F66AA97659CA}" type="datetimeFigureOut">
               <a:rPr lang="en-US"/>
-              <a:t>5/8/2025</a:t>
+              <a:t>5/9/2025</a:t>
             </a:fld>
             <a:endParaRPr/>
           </a:p>
@@ -3446,7 +3452,7 @@
           <a:p>
             <a:fld id="{F0DFD029-FB74-4578-B929-F66AA97659CA}" type="datetimeFigureOut">
               <a:rPr lang="en-US"/>
-              <a:t>5/8/2025</a:t>
+              <a:t>5/9/2025</a:t>
             </a:fld>
             <a:endParaRPr/>
           </a:p>
@@ -3553,7 +3559,7 @@
           <a:p>
             <a:fld id="{F0DFD029-FB74-4578-B929-F66AA97659CA}" type="datetimeFigureOut">
               <a:rPr lang="en-US"/>
-              <a:t>5/8/2025</a:t>
+              <a:t>5/9/2025</a:t>
             </a:fld>
             <a:endParaRPr/>
           </a:p>
@@ -3852,7 +3858,7 @@
           <a:p>
             <a:fld id="{F0DFD029-FB74-4578-B929-F66AA97659CA}" type="datetimeFigureOut">
               <a:rPr lang="en-US"/>
-              <a:t>5/8/2025</a:t>
+              <a:t>5/9/2025</a:t>
             </a:fld>
             <a:endParaRPr/>
           </a:p>
@@ -4140,7 +4146,7 @@
           <a:p>
             <a:fld id="{F0DFD029-FB74-4578-B929-F66AA97659CA}" type="datetimeFigureOut">
               <a:rPr lang="en-US"/>
-              <a:t>5/8/2025</a:t>
+              <a:t>5/9/2025</a:t>
             </a:fld>
             <a:endParaRPr/>
           </a:p>
@@ -4763,7 +4769,7 @@
             <a:fld id="{F0DFD029-FB74-4578-B929-F66AA97659CA}" type="datetimeFigureOut">
               <a:rPr lang="en-US"/>
               <a:pPr/>
-              <a:t>5/8/2025</a:t>
+              <a:t>5/9/2025</a:t>
             </a:fld>
             <a:endParaRPr/>
           </a:p>
@@ -6405,7 +6411,13 @@
   <p:cSld>
     <p:spTree>
       <p:nvGrpSpPr>
-        <p:cNvPr id="1" name=""/>
+        <p:cNvPr id="1" name="">
+          <a:extLst>
+            <a:ext uri="{FF2B5EF4-FFF2-40B4-BE49-F238E27FC236}">
+              <a16:creationId xmlns:a16="http://schemas.microsoft.com/office/drawing/2014/main" id="{C4627170-6421-5B9C-D4B5-992E7F7CEBE3}"/>
+            </a:ext>
+          </a:extLst>
+        </p:cNvPr>
         <p:cNvGrpSpPr/>
         <p:nvPr/>
       </p:nvGrpSpPr>
@@ -6419,7 +6431,13 @@
       </p:grpSpPr>
       <p:sp>
         <p:nvSpPr>
-          <p:cNvPr id="2" name="Title 1"/>
+          <p:cNvPr id="4" name="Title 3">
+            <a:extLst>
+              <a:ext uri="{FF2B5EF4-FFF2-40B4-BE49-F238E27FC236}">
+                <a16:creationId xmlns:a16="http://schemas.microsoft.com/office/drawing/2014/main" id="{3371A26A-BC16-E7A7-0171-167B10C2170C}"/>
+              </a:ext>
+            </a:extLst>
+          </p:cNvPr>
           <p:cNvSpPr>
             <a:spLocks noGrp="1"/>
           </p:cNvSpPr>
@@ -6434,19 +6452,25 @@
           <a:p>
             <a:r>
               <a:rPr lang="en-US" dirty="0"/>
-              <a:t>Add a Slide Title - 4</a:t>
+              <a:t>Security Aspects Considered in Game Client</a:t>
             </a:r>
           </a:p>
         </p:txBody>
       </p:sp>
       <p:sp>
         <p:nvSpPr>
-          <p:cNvPr id="4" name="Text Placeholder 3"/>
+          <p:cNvPr id="5" name="Text Placeholder 4">
+            <a:extLst>
+              <a:ext uri="{FF2B5EF4-FFF2-40B4-BE49-F238E27FC236}">
+                <a16:creationId xmlns:a16="http://schemas.microsoft.com/office/drawing/2014/main" id="{BF218D39-8C8A-76F0-3F86-07CB3C5AF753}"/>
+              </a:ext>
+            </a:extLst>
+          </p:cNvPr>
           <p:cNvSpPr>
             <a:spLocks noGrp="1"/>
           </p:cNvSpPr>
           <p:nvPr>
-            <p:ph type="body" sz="half" idx="2"/>
+            <p:ph type="body" idx="1"/>
           </p:nvPr>
         </p:nvSpPr>
         <p:spPr/>
@@ -6454,18 +6478,81 @@
           <a:bodyPr/>
           <a:lstStyle/>
           <a:p>
+            <a:r>
+              <a:rPr lang="en-US" sz="2800" kern="100" dirty="0">
+                <a:effectLst/>
+                <a:latin typeface="Cambria" panose="02040503050406030204" pitchFamily="18" charset="0"/>
+                <a:ea typeface="Cambria" panose="02040503050406030204" pitchFamily="18" charset="0"/>
+                <a:cs typeface="Cambria" panose="02040503050406030204" pitchFamily="18" charset="0"/>
+              </a:rPr>
+              <a:t>MD SAKIB HASAN</a:t>
+            </a:r>
             <a:endParaRPr lang="en-US" dirty="0"/>
           </a:p>
         </p:txBody>
       </p:sp>
+    </p:spTree>
+    <p:extLst>
+      <p:ext uri="{BB962C8B-B14F-4D97-AF65-F5344CB8AC3E}">
+        <p14:creationId xmlns:p14="http://schemas.microsoft.com/office/powerpoint/2010/main" val="4152500528"/>
+      </p:ext>
+    </p:extLst>
+  </p:cSld>
+  <p:clrMapOvr>
+    <a:masterClrMapping/>
+  </p:clrMapOvr>
+  <mc:AlternateContent xmlns:mc="http://schemas.openxmlformats.org/markup-compatibility/2006">
+    <mc:Choice xmlns:p14="http://schemas.microsoft.com/office/powerpoint/2010/main" Requires="p14">
+      <p:transition spd="med" p14:dur="700">
+        <p:fade/>
+      </p:transition>
+    </mc:Choice>
+    <mc:Fallback>
+      <p:transition spd="med">
+        <p:fade/>
+      </p:transition>
+    </mc:Fallback>
+  </mc:AlternateContent>
+</p:sld>
+</file>
+
+<file path=ppt/slides/slide15.xml><?xml version="1.0" encoding="utf-8"?>
+<p:sld xmlns:a="http://schemas.openxmlformats.org/drawingml/2006/main" xmlns:r="http://schemas.openxmlformats.org/officeDocument/2006/relationships" xmlns:p="http://schemas.openxmlformats.org/presentationml/2006/main">
+  <p:cSld>
+    <p:spTree>
+      <p:nvGrpSpPr>
+        <p:cNvPr id="1" name="">
+          <a:extLst>
+            <a:ext uri="{FF2B5EF4-FFF2-40B4-BE49-F238E27FC236}">
+              <a16:creationId xmlns:a16="http://schemas.microsoft.com/office/drawing/2014/main" id="{DF46AA82-05E3-6F2B-5673-4C18172E5852}"/>
+            </a:ext>
+          </a:extLst>
+        </p:cNvPr>
+        <p:cNvGrpSpPr/>
+        <p:nvPr/>
+      </p:nvGrpSpPr>
+      <p:grpSpPr>
+        <a:xfrm>
+          <a:off x="0" y="0"/>
+          <a:ext cx="0" cy="0"/>
+          <a:chOff x="0" y="0"/>
+          <a:chExt cx="0" cy="0"/>
+        </a:xfrm>
+      </p:grpSpPr>
       <p:sp>
         <p:nvSpPr>
-          <p:cNvPr id="3" name="Content Placeholder 2"/>
+          <p:cNvPr id="7" name="Title 6">
+            <a:extLst>
+              <a:ext uri="{FF2B5EF4-FFF2-40B4-BE49-F238E27FC236}">
+                <a16:creationId xmlns:a16="http://schemas.microsoft.com/office/drawing/2014/main" id="{26F34F2B-D676-7B96-4859-0B8766B2D979}"/>
+              </a:ext>
+            </a:extLst>
+          </p:cNvPr>
           <p:cNvSpPr>
             <a:spLocks noGrp="1"/>
           </p:cNvSpPr>
           <p:nvPr>
-            <p:ph idx="1"/>
+            <p:ph type="title"/>
           </p:nvPr>
         </p:nvSpPr>
         <p:spPr/>
@@ -6473,27 +6560,869 @@
           <a:bodyPr/>
           <a:lstStyle/>
           <a:p>
+            <a:r>
+              <a:rPr lang="en-GB" dirty="0"/>
+              <a:t>Secure Locally Stored Credentials</a:t>
+            </a:r>
             <a:endParaRPr lang="en-US" dirty="0"/>
+          </a:p>
+        </p:txBody>
+      </p:sp>
+      <p:pic>
+        <p:nvPicPr>
+          <p:cNvPr id="6" name="Picture 5">
+            <a:extLst>
+              <a:ext uri="{FF2B5EF4-FFF2-40B4-BE49-F238E27FC236}">
+                <a16:creationId xmlns:a16="http://schemas.microsoft.com/office/drawing/2014/main" id="{C1F73D4D-0E8A-3C2F-95CB-41E176E4585F}"/>
+              </a:ext>
+            </a:extLst>
+          </p:cNvPr>
+          <p:cNvPicPr>
+            <a:picLocks noChangeAspect="1"/>
+          </p:cNvPicPr>
+          <p:nvPr/>
+        </p:nvPicPr>
+        <p:blipFill>
+          <a:blip r:embed="rId2">
+            <a:extLst>
+              <a:ext uri="{28A0092B-C50C-407E-A947-70E740481C1C}">
+                <a14:useLocalDpi xmlns:a14="http://schemas.microsoft.com/office/drawing/2010/main" val="0"/>
+              </a:ext>
+            </a:extLst>
+          </a:blip>
+          <a:stretch>
+            <a:fillRect/>
+          </a:stretch>
+        </p:blipFill>
+        <p:spPr>
+          <a:xfrm>
+            <a:off x="1561012" y="3133800"/>
+            <a:ext cx="4469701" cy="2881187"/>
+          </a:xfrm>
+          <a:prstGeom prst="rect">
+            <a:avLst/>
+          </a:prstGeom>
+        </p:spPr>
+      </p:pic>
+      <p:pic>
+        <p:nvPicPr>
+          <p:cNvPr id="9" name="Picture 8">
+            <a:extLst>
+              <a:ext uri="{FF2B5EF4-FFF2-40B4-BE49-F238E27FC236}">
+                <a16:creationId xmlns:a16="http://schemas.microsoft.com/office/drawing/2014/main" id="{196C177E-84E6-E42B-B866-06823F2EF1B5}"/>
+              </a:ext>
+            </a:extLst>
+          </p:cNvPr>
+          <p:cNvPicPr>
+            <a:picLocks noChangeAspect="1"/>
+          </p:cNvPicPr>
+          <p:nvPr/>
+        </p:nvPicPr>
+        <p:blipFill>
+          <a:blip r:embed="rId3">
+            <a:extLst>
+              <a:ext uri="{28A0092B-C50C-407E-A947-70E740481C1C}">
+                <a14:useLocalDpi xmlns:a14="http://schemas.microsoft.com/office/drawing/2010/main" val="0"/>
+              </a:ext>
+            </a:extLst>
+          </a:blip>
+          <a:stretch>
+            <a:fillRect/>
+          </a:stretch>
+        </p:blipFill>
+        <p:spPr>
+          <a:xfrm>
+            <a:off x="6158113" y="3144069"/>
+            <a:ext cx="4650300" cy="2881187"/>
+          </a:xfrm>
+          <a:prstGeom prst="rect">
+            <a:avLst/>
+          </a:prstGeom>
+        </p:spPr>
+      </p:pic>
+      <p:sp>
+        <p:nvSpPr>
+          <p:cNvPr id="13" name="TextBox 12">
+            <a:extLst>
+              <a:ext uri="{FF2B5EF4-FFF2-40B4-BE49-F238E27FC236}">
+                <a16:creationId xmlns:a16="http://schemas.microsoft.com/office/drawing/2014/main" id="{E154A449-827F-DB29-9A74-A683AB94F7E3}"/>
+              </a:ext>
+            </a:extLst>
+          </p:cNvPr>
+          <p:cNvSpPr txBox="1"/>
+          <p:nvPr/>
+        </p:nvSpPr>
+        <p:spPr>
+          <a:xfrm>
+            <a:off x="1218883" y="1844824"/>
+            <a:ext cx="5153960" cy="923330"/>
+          </a:xfrm>
+          <a:prstGeom prst="rect">
+            <a:avLst/>
+          </a:prstGeom>
+          <a:noFill/>
+        </p:spPr>
+        <p:txBody>
+          <a:bodyPr wrap="square" rtlCol="0">
+            <a:spAutoFit/>
+          </a:bodyPr>
+          <a:lstStyle/>
+          <a:p>
+            <a:pPr marL="285750" indent="-285750">
+              <a:buFont typeface="Arial" panose="020B0604020202020204" pitchFamily="34" charset="0"/>
+              <a:buChar char="•"/>
+            </a:pPr>
+            <a:r>
+              <a:rPr lang="en-US" sz="1800" dirty="0">
+                <a:effectLst/>
+                <a:latin typeface="Calibri" panose="020F0502020204030204" pitchFamily="34" charset="0"/>
+                <a:ea typeface="Aptos" panose="020B0004020202020204" pitchFamily="34" charset="0"/>
+              </a:rPr>
+              <a:t>Persistent login</a:t>
+            </a:r>
+          </a:p>
+          <a:p>
+            <a:pPr marL="285750" indent="-285750">
+              <a:buFont typeface="Arial" panose="020B0604020202020204" pitchFamily="34" charset="0"/>
+              <a:buChar char="•"/>
+            </a:pPr>
+            <a:r>
+              <a:rPr lang="en-US" sz="1800" dirty="0">
+                <a:effectLst/>
+                <a:latin typeface="Calibri" panose="020F0502020204030204" pitchFamily="34" charset="0"/>
+                <a:ea typeface="Aptos" panose="020B0004020202020204" pitchFamily="34" charset="0"/>
+              </a:rPr>
+              <a:t>Locally stored user credentials</a:t>
+            </a:r>
+          </a:p>
+          <a:p>
+            <a:pPr marL="285750" indent="-285750">
+              <a:buFont typeface="Arial" panose="020B0604020202020204" pitchFamily="34" charset="0"/>
+              <a:buChar char="•"/>
+            </a:pPr>
+            <a:r>
+              <a:rPr lang="en-US" sz="1800" dirty="0">
+                <a:latin typeface="Calibri" panose="020F0502020204030204" pitchFamily="34" charset="0"/>
+              </a:rPr>
+              <a:t>AES Encrypted</a:t>
+            </a:r>
+            <a:endParaRPr lang="en-US" sz="2800" dirty="0"/>
           </a:p>
         </p:txBody>
       </p:sp>
     </p:spTree>
     <p:extLst>
       <p:ext uri="{BB962C8B-B14F-4D97-AF65-F5344CB8AC3E}">
-        <p14:creationId xmlns:p14="http://schemas.microsoft.com/office/powerpoint/2010/main" val="2319046984"/>
+        <p14:creationId xmlns:p14="http://schemas.microsoft.com/office/powerpoint/2010/main" val="604516925"/>
       </p:ext>
     </p:extLst>
   </p:cSld>
   <p:clrMapOvr>
     <a:masterClrMapping/>
   </p:clrMapOvr>
-  <mc:AlternateContent xmlns:mc="http://schemas.openxmlformats.org/markup-compatibility/2006" xmlns:p14="http://schemas.microsoft.com/office/powerpoint/2010/main">
-    <mc:Choice Requires="p14">
+  <mc:AlternateContent xmlns:mc="http://schemas.openxmlformats.org/markup-compatibility/2006">
+    <mc:Choice xmlns:p14="http://schemas.microsoft.com/office/powerpoint/2010/main" Requires="p14">
       <p:transition spd="med" p14:dur="700">
         <p:fade/>
       </p:transition>
     </mc:Choice>
-    <mc:Fallback xmlns="">
+    <mc:Fallback>
+      <p:transition spd="med">
+        <p:fade/>
+      </p:transition>
+    </mc:Fallback>
+  </mc:AlternateContent>
+</p:sld>
+</file>
+
+<file path=ppt/slides/slide16.xml><?xml version="1.0" encoding="utf-8"?>
+<p:sld xmlns:a="http://schemas.openxmlformats.org/drawingml/2006/main" xmlns:r="http://schemas.openxmlformats.org/officeDocument/2006/relationships" xmlns:p="http://schemas.openxmlformats.org/presentationml/2006/main">
+  <p:cSld>
+    <p:spTree>
+      <p:nvGrpSpPr>
+        <p:cNvPr id="1" name="">
+          <a:extLst>
+            <a:ext uri="{FF2B5EF4-FFF2-40B4-BE49-F238E27FC236}">
+              <a16:creationId xmlns:a16="http://schemas.microsoft.com/office/drawing/2014/main" id="{86000E6D-9E24-94D5-6C9A-1B9A7C99F66D}"/>
+            </a:ext>
+          </a:extLst>
+        </p:cNvPr>
+        <p:cNvGrpSpPr/>
+        <p:nvPr/>
+      </p:nvGrpSpPr>
+      <p:grpSpPr>
+        <a:xfrm>
+          <a:off x="0" y="0"/>
+          <a:ext cx="0" cy="0"/>
+          <a:chOff x="0" y="0"/>
+          <a:chExt cx="0" cy="0"/>
+        </a:xfrm>
+      </p:grpSpPr>
+      <p:sp>
+        <p:nvSpPr>
+          <p:cNvPr id="7" name="Title 6">
+            <a:extLst>
+              <a:ext uri="{FF2B5EF4-FFF2-40B4-BE49-F238E27FC236}">
+                <a16:creationId xmlns:a16="http://schemas.microsoft.com/office/drawing/2014/main" id="{FAE442D7-F1B0-001D-DBCB-5586D1BA19D9}"/>
+              </a:ext>
+            </a:extLst>
+          </p:cNvPr>
+          <p:cNvSpPr>
+            <a:spLocks noGrp="1"/>
+          </p:cNvSpPr>
+          <p:nvPr>
+            <p:ph type="title"/>
+          </p:nvPr>
+        </p:nvSpPr>
+        <p:spPr/>
+        <p:txBody>
+          <a:bodyPr/>
+          <a:lstStyle/>
+          <a:p>
+            <a:r>
+              <a:rPr lang="en-GB" dirty="0"/>
+              <a:t>Secure Auth APIs</a:t>
+            </a:r>
+            <a:endParaRPr lang="en-US" dirty="0"/>
+          </a:p>
+        </p:txBody>
+      </p:sp>
+      <p:sp>
+        <p:nvSpPr>
+          <p:cNvPr id="13" name="TextBox 12">
+            <a:extLst>
+              <a:ext uri="{FF2B5EF4-FFF2-40B4-BE49-F238E27FC236}">
+                <a16:creationId xmlns:a16="http://schemas.microsoft.com/office/drawing/2014/main" id="{9003B13A-D939-CF36-A24F-87643034E42D}"/>
+              </a:ext>
+            </a:extLst>
+          </p:cNvPr>
+          <p:cNvSpPr txBox="1"/>
+          <p:nvPr/>
+        </p:nvSpPr>
+        <p:spPr>
+          <a:xfrm>
+            <a:off x="1218883" y="1845990"/>
+            <a:ext cx="4155449" cy="646331"/>
+          </a:xfrm>
+          <a:prstGeom prst="rect">
+            <a:avLst/>
+          </a:prstGeom>
+          <a:noFill/>
+        </p:spPr>
+        <p:txBody>
+          <a:bodyPr wrap="square" rtlCol="0">
+            <a:spAutoFit/>
+          </a:bodyPr>
+          <a:lstStyle/>
+          <a:p>
+            <a:pPr marL="285750" indent="-285750">
+              <a:buFont typeface="Arial" panose="020B0604020202020204" pitchFamily="34" charset="0"/>
+              <a:buChar char="•"/>
+            </a:pPr>
+            <a:r>
+              <a:rPr lang="en-US" sz="1800" dirty="0">
+                <a:effectLst/>
+                <a:latin typeface="Calibri" panose="020F0502020204030204" pitchFamily="34" charset="0"/>
+                <a:ea typeface="Aptos" panose="020B0004020202020204" pitchFamily="34" charset="0"/>
+              </a:rPr>
+              <a:t>Encrypted Sign In info</a:t>
+            </a:r>
+          </a:p>
+          <a:p>
+            <a:pPr marL="285750" indent="-285750">
+              <a:buFont typeface="Arial" panose="020B0604020202020204" pitchFamily="34" charset="0"/>
+              <a:buChar char="•"/>
+            </a:pPr>
+            <a:r>
+              <a:rPr lang="en-US" sz="1800" dirty="0">
+                <a:effectLst/>
+                <a:latin typeface="Calibri" panose="020F0502020204030204" pitchFamily="34" charset="0"/>
+                <a:ea typeface="Aptos" panose="020B0004020202020204" pitchFamily="34" charset="0"/>
+              </a:rPr>
+              <a:t>Encrypted Sign Up info</a:t>
+            </a:r>
+          </a:p>
+        </p:txBody>
+      </p:sp>
+      <p:pic>
+        <p:nvPicPr>
+          <p:cNvPr id="3" name="Picture 2">
+            <a:extLst>
+              <a:ext uri="{FF2B5EF4-FFF2-40B4-BE49-F238E27FC236}">
+                <a16:creationId xmlns:a16="http://schemas.microsoft.com/office/drawing/2014/main" id="{CE2DF391-57A9-3D11-819C-825AA0978456}"/>
+              </a:ext>
+            </a:extLst>
+          </p:cNvPr>
+          <p:cNvPicPr>
+            <a:picLocks noChangeAspect="1"/>
+          </p:cNvPicPr>
+          <p:nvPr/>
+        </p:nvPicPr>
+        <p:blipFill>
+          <a:blip r:embed="rId2"/>
+          <a:stretch>
+            <a:fillRect/>
+          </a:stretch>
+        </p:blipFill>
+        <p:spPr>
+          <a:xfrm>
+            <a:off x="5662364" y="3734122"/>
+            <a:ext cx="5734850" cy="2332386"/>
+          </a:xfrm>
+          <a:prstGeom prst="rect">
+            <a:avLst/>
+          </a:prstGeom>
+        </p:spPr>
+      </p:pic>
+      <p:pic>
+        <p:nvPicPr>
+          <p:cNvPr id="5" name="Picture 4">
+            <a:extLst>
+              <a:ext uri="{FF2B5EF4-FFF2-40B4-BE49-F238E27FC236}">
+                <a16:creationId xmlns:a16="http://schemas.microsoft.com/office/drawing/2014/main" id="{513A8603-50F9-A54B-B5AD-1C600AFCB5F4}"/>
+              </a:ext>
+            </a:extLst>
+          </p:cNvPr>
+          <p:cNvPicPr>
+            <a:picLocks noChangeAspect="1"/>
+          </p:cNvPicPr>
+          <p:nvPr/>
+        </p:nvPicPr>
+        <p:blipFill>
+          <a:blip r:embed="rId3">
+            <a:extLst>
+              <a:ext uri="{28A0092B-C50C-407E-A947-70E740481C1C}">
+                <a14:useLocalDpi xmlns:a14="http://schemas.microsoft.com/office/drawing/2010/main" val="0"/>
+              </a:ext>
+            </a:extLst>
+          </a:blip>
+          <a:stretch>
+            <a:fillRect/>
+          </a:stretch>
+        </p:blipFill>
+        <p:spPr>
+          <a:xfrm>
+            <a:off x="5662364" y="1844824"/>
+            <a:ext cx="5734850" cy="1762371"/>
+          </a:xfrm>
+          <a:prstGeom prst="rect">
+            <a:avLst/>
+          </a:prstGeom>
+        </p:spPr>
+      </p:pic>
+    </p:spTree>
+    <p:extLst>
+      <p:ext uri="{BB962C8B-B14F-4D97-AF65-F5344CB8AC3E}">
+        <p14:creationId xmlns:p14="http://schemas.microsoft.com/office/powerpoint/2010/main" val="2829625849"/>
+      </p:ext>
+    </p:extLst>
+  </p:cSld>
+  <p:clrMapOvr>
+    <a:masterClrMapping/>
+  </p:clrMapOvr>
+  <mc:AlternateContent xmlns:mc="http://schemas.openxmlformats.org/markup-compatibility/2006">
+    <mc:Choice xmlns:p14="http://schemas.microsoft.com/office/powerpoint/2010/main" Requires="p14">
+      <p:transition spd="med" p14:dur="700">
+        <p:fade/>
+      </p:transition>
+    </mc:Choice>
+    <mc:Fallback>
+      <p:transition spd="med">
+        <p:fade/>
+      </p:transition>
+    </mc:Fallback>
+  </mc:AlternateContent>
+</p:sld>
+</file>
+
+<file path=ppt/slides/slide17.xml><?xml version="1.0" encoding="utf-8"?>
+<p:sld xmlns:a="http://schemas.openxmlformats.org/drawingml/2006/main" xmlns:r="http://schemas.openxmlformats.org/officeDocument/2006/relationships" xmlns:p="http://schemas.openxmlformats.org/presentationml/2006/main">
+  <p:cSld>
+    <p:spTree>
+      <p:nvGrpSpPr>
+        <p:cNvPr id="1" name="">
+          <a:extLst>
+            <a:ext uri="{FF2B5EF4-FFF2-40B4-BE49-F238E27FC236}">
+              <a16:creationId xmlns:a16="http://schemas.microsoft.com/office/drawing/2014/main" id="{402481E0-830B-670F-05B7-C5DB6755467F}"/>
+            </a:ext>
+          </a:extLst>
+        </p:cNvPr>
+        <p:cNvGrpSpPr/>
+        <p:nvPr/>
+      </p:nvGrpSpPr>
+      <p:grpSpPr>
+        <a:xfrm>
+          <a:off x="0" y="0"/>
+          <a:ext cx="0" cy="0"/>
+          <a:chOff x="0" y="0"/>
+          <a:chExt cx="0" cy="0"/>
+        </a:xfrm>
+      </p:grpSpPr>
+      <p:sp>
+        <p:nvSpPr>
+          <p:cNvPr id="7" name="Title 6">
+            <a:extLst>
+              <a:ext uri="{FF2B5EF4-FFF2-40B4-BE49-F238E27FC236}">
+                <a16:creationId xmlns:a16="http://schemas.microsoft.com/office/drawing/2014/main" id="{2C04E6E5-72BE-ACF7-77DA-8F4F67761098}"/>
+              </a:ext>
+            </a:extLst>
+          </p:cNvPr>
+          <p:cNvSpPr>
+            <a:spLocks noGrp="1"/>
+          </p:cNvSpPr>
+          <p:nvPr>
+            <p:ph type="title"/>
+          </p:nvPr>
+        </p:nvSpPr>
+        <p:spPr/>
+        <p:txBody>
+          <a:bodyPr/>
+          <a:lstStyle/>
+          <a:p>
+            <a:r>
+              <a:rPr lang="en-GB" dirty="0"/>
+              <a:t>Preserve Game States</a:t>
+            </a:r>
+            <a:endParaRPr lang="en-US" dirty="0"/>
+          </a:p>
+        </p:txBody>
+      </p:sp>
+      <p:sp>
+        <p:nvSpPr>
+          <p:cNvPr id="13" name="TextBox 12">
+            <a:extLst>
+              <a:ext uri="{FF2B5EF4-FFF2-40B4-BE49-F238E27FC236}">
+                <a16:creationId xmlns:a16="http://schemas.microsoft.com/office/drawing/2014/main" id="{83D350DE-441A-A954-6156-701A9DBF3AFC}"/>
+              </a:ext>
+            </a:extLst>
+          </p:cNvPr>
+          <p:cNvSpPr txBox="1"/>
+          <p:nvPr/>
+        </p:nvSpPr>
+        <p:spPr>
+          <a:xfrm>
+            <a:off x="1218883" y="1844824"/>
+            <a:ext cx="5153960" cy="646331"/>
+          </a:xfrm>
+          <a:prstGeom prst="rect">
+            <a:avLst/>
+          </a:prstGeom>
+          <a:noFill/>
+        </p:spPr>
+        <p:txBody>
+          <a:bodyPr wrap="square" rtlCol="0">
+            <a:spAutoFit/>
+          </a:bodyPr>
+          <a:lstStyle/>
+          <a:p>
+            <a:pPr marL="285750" indent="-285750">
+              <a:buFont typeface="Arial" panose="020B0604020202020204" pitchFamily="34" charset="0"/>
+              <a:buChar char="•"/>
+            </a:pPr>
+            <a:r>
+              <a:rPr lang="en-US" sz="1800" dirty="0">
+                <a:effectLst/>
+                <a:latin typeface="Calibri" panose="020F0502020204030204" pitchFamily="34" charset="0"/>
+                <a:ea typeface="Aptos" panose="020B0004020202020204" pitchFamily="34" charset="0"/>
+              </a:rPr>
+              <a:t>Controlling availability of interactions</a:t>
+            </a:r>
+          </a:p>
+          <a:p>
+            <a:pPr marL="285750" indent="-285750">
+              <a:buFont typeface="Arial" panose="020B0604020202020204" pitchFamily="34" charset="0"/>
+              <a:buChar char="•"/>
+            </a:pPr>
+            <a:r>
+              <a:rPr lang="en-GB" sz="1800" dirty="0">
+                <a:effectLst/>
+                <a:latin typeface="Calibri" panose="020F0502020204030204" pitchFamily="34" charset="0"/>
+                <a:ea typeface="Aptos" panose="020B0004020202020204" pitchFamily="34" charset="0"/>
+              </a:rPr>
+              <a:t>Validating the requested actions in backend</a:t>
+            </a:r>
+            <a:endParaRPr lang="en-US" sz="1800" dirty="0">
+              <a:effectLst/>
+              <a:latin typeface="Calibri" panose="020F0502020204030204" pitchFamily="34" charset="0"/>
+              <a:ea typeface="Aptos" panose="020B0004020202020204" pitchFamily="34" charset="0"/>
+            </a:endParaRPr>
+          </a:p>
+        </p:txBody>
+      </p:sp>
+      <p:pic>
+        <p:nvPicPr>
+          <p:cNvPr id="2" name="Picture 1">
+            <a:extLst>
+              <a:ext uri="{FF2B5EF4-FFF2-40B4-BE49-F238E27FC236}">
+                <a16:creationId xmlns:a16="http://schemas.microsoft.com/office/drawing/2014/main" id="{24839A27-E6A1-52AB-AF44-49CB1FEAD513}"/>
+              </a:ext>
+            </a:extLst>
+          </p:cNvPr>
+          <p:cNvPicPr>
+            <a:picLocks noChangeAspect="1"/>
+          </p:cNvPicPr>
+          <p:nvPr/>
+        </p:nvPicPr>
+        <p:blipFill>
+          <a:blip r:embed="rId2"/>
+          <a:srcRect l="2773"/>
+          <a:stretch/>
+        </p:blipFill>
+        <p:spPr>
+          <a:xfrm>
+            <a:off x="1718613" y="3429000"/>
+            <a:ext cx="9361040" cy="3081250"/>
+          </a:xfrm>
+          <a:prstGeom prst="rect">
+            <a:avLst/>
+          </a:prstGeom>
+        </p:spPr>
+      </p:pic>
+    </p:spTree>
+    <p:extLst>
+      <p:ext uri="{BB962C8B-B14F-4D97-AF65-F5344CB8AC3E}">
+        <p14:creationId xmlns:p14="http://schemas.microsoft.com/office/powerpoint/2010/main" val="2134779016"/>
+      </p:ext>
+    </p:extLst>
+  </p:cSld>
+  <p:clrMapOvr>
+    <a:masterClrMapping/>
+  </p:clrMapOvr>
+  <mc:AlternateContent xmlns:mc="http://schemas.openxmlformats.org/markup-compatibility/2006">
+    <mc:Choice xmlns:p14="http://schemas.microsoft.com/office/powerpoint/2010/main" Requires="p14">
+      <p:transition spd="med" p14:dur="700">
+        <p:fade/>
+      </p:transition>
+    </mc:Choice>
+    <mc:Fallback>
+      <p:transition spd="med">
+        <p:fade/>
+      </p:transition>
+    </mc:Fallback>
+  </mc:AlternateContent>
+</p:sld>
+</file>
+
+<file path=ppt/slides/slide18.xml><?xml version="1.0" encoding="utf-8"?>
+<p:sld xmlns:a="http://schemas.openxmlformats.org/drawingml/2006/main" xmlns:r="http://schemas.openxmlformats.org/officeDocument/2006/relationships" xmlns:p="http://schemas.openxmlformats.org/presentationml/2006/main">
+  <p:cSld>
+    <p:spTree>
+      <p:nvGrpSpPr>
+        <p:cNvPr id="1" name="">
+          <a:extLst>
+            <a:ext uri="{FF2B5EF4-FFF2-40B4-BE49-F238E27FC236}">
+              <a16:creationId xmlns:a16="http://schemas.microsoft.com/office/drawing/2014/main" id="{5C2B3D0F-31C7-2067-479C-519B1F367BB1}"/>
+            </a:ext>
+          </a:extLst>
+        </p:cNvPr>
+        <p:cNvGrpSpPr/>
+        <p:nvPr/>
+      </p:nvGrpSpPr>
+      <p:grpSpPr>
+        <a:xfrm>
+          <a:off x="0" y="0"/>
+          <a:ext cx="0" cy="0"/>
+          <a:chOff x="0" y="0"/>
+          <a:chExt cx="0" cy="0"/>
+        </a:xfrm>
+      </p:grpSpPr>
+      <p:sp>
+        <p:nvSpPr>
+          <p:cNvPr id="7" name="Title 6">
+            <a:extLst>
+              <a:ext uri="{FF2B5EF4-FFF2-40B4-BE49-F238E27FC236}">
+                <a16:creationId xmlns:a16="http://schemas.microsoft.com/office/drawing/2014/main" id="{8C082B4C-C617-E176-C52B-3DC448A5EFB9}"/>
+              </a:ext>
+            </a:extLst>
+          </p:cNvPr>
+          <p:cNvSpPr>
+            <a:spLocks noGrp="1"/>
+          </p:cNvSpPr>
+          <p:nvPr>
+            <p:ph type="title"/>
+          </p:nvPr>
+        </p:nvSpPr>
+        <p:spPr/>
+        <p:txBody>
+          <a:bodyPr/>
+          <a:lstStyle/>
+          <a:p>
+            <a:r>
+              <a:rPr lang="en-GB" dirty="0"/>
+              <a:t>Anti Cheat</a:t>
+            </a:r>
+            <a:endParaRPr lang="en-US" dirty="0"/>
+          </a:p>
+        </p:txBody>
+      </p:sp>
+      <p:sp>
+        <p:nvSpPr>
+          <p:cNvPr id="13" name="TextBox 12">
+            <a:extLst>
+              <a:ext uri="{FF2B5EF4-FFF2-40B4-BE49-F238E27FC236}">
+                <a16:creationId xmlns:a16="http://schemas.microsoft.com/office/drawing/2014/main" id="{77083014-A943-BDA5-B5ED-4674F06D261F}"/>
+              </a:ext>
+            </a:extLst>
+          </p:cNvPr>
+          <p:cNvSpPr txBox="1"/>
+          <p:nvPr/>
+        </p:nvSpPr>
+        <p:spPr>
+          <a:xfrm>
+            <a:off x="1218883" y="1844824"/>
+            <a:ext cx="3579385" cy="646331"/>
+          </a:xfrm>
+          <a:prstGeom prst="rect">
+            <a:avLst/>
+          </a:prstGeom>
+          <a:noFill/>
+        </p:spPr>
+        <p:txBody>
+          <a:bodyPr wrap="square" rtlCol="0">
+            <a:spAutoFit/>
+          </a:bodyPr>
+          <a:lstStyle/>
+          <a:p>
+            <a:pPr marL="285750" indent="-285750">
+              <a:buFont typeface="Arial" panose="020B0604020202020204" pitchFamily="34" charset="0"/>
+              <a:buChar char="•"/>
+            </a:pPr>
+            <a:r>
+              <a:rPr lang="en-GB" sz="1800" dirty="0">
+                <a:effectLst/>
+                <a:latin typeface="Calibri" panose="020F0502020204030204" pitchFamily="34" charset="0"/>
+                <a:ea typeface="Aptos" panose="020B0004020202020204" pitchFamily="34" charset="0"/>
+              </a:rPr>
+              <a:t>Dice-rolling logic on server</a:t>
+            </a:r>
+          </a:p>
+          <a:p>
+            <a:pPr marL="285750" indent="-285750">
+              <a:buFont typeface="Arial" panose="020B0604020202020204" pitchFamily="34" charset="0"/>
+              <a:buChar char="•"/>
+            </a:pPr>
+            <a:r>
+              <a:rPr lang="en-GB" sz="1800" dirty="0">
+                <a:latin typeface="Calibri" panose="020F0502020204030204" pitchFamily="34" charset="0"/>
+                <a:ea typeface="Aptos" panose="020B0004020202020204" pitchFamily="34" charset="0"/>
+              </a:rPr>
+              <a:t>Role management</a:t>
+            </a:r>
+            <a:endParaRPr lang="en-US" sz="1800" dirty="0">
+              <a:effectLst/>
+              <a:latin typeface="Calibri" panose="020F0502020204030204" pitchFamily="34" charset="0"/>
+              <a:ea typeface="Aptos" panose="020B0004020202020204" pitchFamily="34" charset="0"/>
+            </a:endParaRPr>
+          </a:p>
+        </p:txBody>
+      </p:sp>
+      <p:pic>
+        <p:nvPicPr>
+          <p:cNvPr id="3" name="Picture 2">
+            <a:extLst>
+              <a:ext uri="{FF2B5EF4-FFF2-40B4-BE49-F238E27FC236}">
+                <a16:creationId xmlns:a16="http://schemas.microsoft.com/office/drawing/2014/main" id="{2B097E41-8F77-A0CE-2461-A18D67AAB213}"/>
+              </a:ext>
+            </a:extLst>
+          </p:cNvPr>
+          <p:cNvPicPr>
+            <a:picLocks noChangeAspect="1"/>
+          </p:cNvPicPr>
+          <p:nvPr/>
+        </p:nvPicPr>
+        <p:blipFill>
+          <a:blip r:embed="rId2"/>
+          <a:stretch>
+            <a:fillRect/>
+          </a:stretch>
+        </p:blipFill>
+        <p:spPr>
+          <a:xfrm>
+            <a:off x="5070226" y="1844824"/>
+            <a:ext cx="6493084" cy="3910525"/>
+          </a:xfrm>
+          <a:prstGeom prst="rect">
+            <a:avLst/>
+          </a:prstGeom>
+        </p:spPr>
+      </p:pic>
+    </p:spTree>
+    <p:extLst>
+      <p:ext uri="{BB962C8B-B14F-4D97-AF65-F5344CB8AC3E}">
+        <p14:creationId xmlns:p14="http://schemas.microsoft.com/office/powerpoint/2010/main" val="4033389881"/>
+      </p:ext>
+    </p:extLst>
+  </p:cSld>
+  <p:clrMapOvr>
+    <a:masterClrMapping/>
+  </p:clrMapOvr>
+  <mc:AlternateContent xmlns:mc="http://schemas.openxmlformats.org/markup-compatibility/2006">
+    <mc:Choice xmlns:p14="http://schemas.microsoft.com/office/powerpoint/2010/main" Requires="p14">
+      <p:transition spd="med" p14:dur="700">
+        <p:fade/>
+      </p:transition>
+    </mc:Choice>
+    <mc:Fallback>
+      <p:transition spd="med">
+        <p:fade/>
+      </p:transition>
+    </mc:Fallback>
+  </mc:AlternateContent>
+</p:sld>
+</file>
+
+<file path=ppt/slides/slide19.xml><?xml version="1.0" encoding="utf-8"?>
+<p:sld xmlns:a="http://schemas.openxmlformats.org/drawingml/2006/main" xmlns:r="http://schemas.openxmlformats.org/officeDocument/2006/relationships" xmlns:p="http://schemas.openxmlformats.org/presentationml/2006/main">
+  <p:cSld>
+    <p:spTree>
+      <p:nvGrpSpPr>
+        <p:cNvPr id="1" name="">
+          <a:extLst>
+            <a:ext uri="{FF2B5EF4-FFF2-40B4-BE49-F238E27FC236}">
+              <a16:creationId xmlns:a16="http://schemas.microsoft.com/office/drawing/2014/main" id="{F4820F09-38E8-992A-C5A6-9CA87320647F}"/>
+            </a:ext>
+          </a:extLst>
+        </p:cNvPr>
+        <p:cNvGrpSpPr/>
+        <p:nvPr/>
+      </p:nvGrpSpPr>
+      <p:grpSpPr>
+        <a:xfrm>
+          <a:off x="0" y="0"/>
+          <a:ext cx="0" cy="0"/>
+          <a:chOff x="0" y="0"/>
+          <a:chExt cx="0" cy="0"/>
+        </a:xfrm>
+      </p:grpSpPr>
+      <p:sp>
+        <p:nvSpPr>
+          <p:cNvPr id="7" name="Title 6">
+            <a:extLst>
+              <a:ext uri="{FF2B5EF4-FFF2-40B4-BE49-F238E27FC236}">
+                <a16:creationId xmlns:a16="http://schemas.microsoft.com/office/drawing/2014/main" id="{FB0B8CDF-A9E6-9613-094A-D20284CD7C6E}"/>
+              </a:ext>
+            </a:extLst>
+          </p:cNvPr>
+          <p:cNvSpPr>
+            <a:spLocks noGrp="1"/>
+          </p:cNvSpPr>
+          <p:nvPr>
+            <p:ph type="title"/>
+          </p:nvPr>
+        </p:nvSpPr>
+        <p:spPr/>
+        <p:txBody>
+          <a:bodyPr/>
+          <a:lstStyle/>
+          <a:p>
+            <a:r>
+              <a:rPr lang="en-GB" dirty="0"/>
+              <a:t>Prevent Statistics Data Manipulation</a:t>
+            </a:r>
+            <a:endParaRPr lang="en-US" dirty="0"/>
+          </a:p>
+        </p:txBody>
+      </p:sp>
+      <p:sp>
+        <p:nvSpPr>
+          <p:cNvPr id="13" name="TextBox 12">
+            <a:extLst>
+              <a:ext uri="{FF2B5EF4-FFF2-40B4-BE49-F238E27FC236}">
+                <a16:creationId xmlns:a16="http://schemas.microsoft.com/office/drawing/2014/main" id="{655C6637-0013-6F24-2A78-E53B2C970331}"/>
+              </a:ext>
+            </a:extLst>
+          </p:cNvPr>
+          <p:cNvSpPr txBox="1"/>
+          <p:nvPr/>
+        </p:nvSpPr>
+        <p:spPr>
+          <a:xfrm>
+            <a:off x="1218883" y="1844824"/>
+            <a:ext cx="4155449" cy="1200329"/>
+          </a:xfrm>
+          <a:prstGeom prst="rect">
+            <a:avLst/>
+          </a:prstGeom>
+          <a:noFill/>
+        </p:spPr>
+        <p:txBody>
+          <a:bodyPr wrap="square" rtlCol="0">
+            <a:spAutoFit/>
+          </a:bodyPr>
+          <a:lstStyle/>
+          <a:p>
+            <a:pPr marL="285750" indent="-285750">
+              <a:buFont typeface="Arial" panose="020B0604020202020204" pitchFamily="34" charset="0"/>
+              <a:buChar char="•"/>
+            </a:pPr>
+            <a:r>
+              <a:rPr lang="en-GB" sz="1800" dirty="0">
+                <a:effectLst/>
+                <a:latin typeface="Calibri" panose="020F0502020204030204" pitchFamily="34" charset="0"/>
+                <a:ea typeface="Aptos" panose="020B0004020202020204" pitchFamily="34" charset="0"/>
+              </a:rPr>
+              <a:t>Game service detects game over</a:t>
+            </a:r>
+            <a:r>
+              <a:rPr lang="en-GB" sz="1800" dirty="0">
+                <a:latin typeface="Calibri" panose="020F0502020204030204" pitchFamily="34" charset="0"/>
+                <a:ea typeface="Aptos" panose="020B0004020202020204" pitchFamily="34" charset="0"/>
+              </a:rPr>
+              <a:t> </a:t>
+            </a:r>
+          </a:p>
+          <a:p>
+            <a:pPr marL="285750" indent="-285750">
+              <a:buFont typeface="Arial" panose="020B0604020202020204" pitchFamily="34" charset="0"/>
+              <a:buChar char="•"/>
+            </a:pPr>
+            <a:r>
+              <a:rPr lang="en-GB" sz="1800" dirty="0">
+                <a:effectLst/>
+                <a:latin typeface="Calibri" panose="020F0502020204030204" pitchFamily="34" charset="0"/>
+                <a:ea typeface="Aptos" panose="020B0004020202020204" pitchFamily="34" charset="0"/>
+              </a:rPr>
+              <a:t>Update or stores last match’s data</a:t>
+            </a:r>
+          </a:p>
+          <a:p>
+            <a:pPr marL="285750" indent="-285750">
+              <a:buFont typeface="Arial" panose="020B0604020202020204" pitchFamily="34" charset="0"/>
+              <a:buChar char="•"/>
+            </a:pPr>
+            <a:r>
+              <a:rPr lang="en-GB" sz="1800" dirty="0">
+                <a:effectLst/>
+                <a:latin typeface="Calibri" panose="020F0502020204030204" pitchFamily="34" charset="0"/>
+                <a:ea typeface="Aptos" panose="020B0004020202020204" pitchFamily="34" charset="0"/>
+              </a:rPr>
+              <a:t>By design prevents any statistics related data manipulation</a:t>
+            </a:r>
+            <a:endParaRPr lang="en-US" sz="1800" dirty="0">
+              <a:effectLst/>
+              <a:latin typeface="Calibri" panose="020F0502020204030204" pitchFamily="34" charset="0"/>
+              <a:ea typeface="Aptos" panose="020B0004020202020204" pitchFamily="34" charset="0"/>
+            </a:endParaRPr>
+          </a:p>
+        </p:txBody>
+      </p:sp>
+    </p:spTree>
+    <p:extLst>
+      <p:ext uri="{BB962C8B-B14F-4D97-AF65-F5344CB8AC3E}">
+        <p14:creationId xmlns:p14="http://schemas.microsoft.com/office/powerpoint/2010/main" val="1025994953"/>
+      </p:ext>
+    </p:extLst>
+  </p:cSld>
+  <p:clrMapOvr>
+    <a:masterClrMapping/>
+  </p:clrMapOvr>
+  <mc:AlternateContent xmlns:mc="http://schemas.openxmlformats.org/markup-compatibility/2006">
+    <mc:Choice xmlns:p14="http://schemas.microsoft.com/office/powerpoint/2010/main" Requires="p14">
+      <p:transition spd="med" p14:dur="700">
+        <p:fade/>
+      </p:transition>
+    </mc:Choice>
+    <mc:Fallback>
       <p:transition spd="med">
         <p:fade/>
       </p:transition>
@@ -6581,7 +7510,7 @@
           <a:p>
             <a:r>
               <a:rPr lang="en-US" dirty="0"/>
-              <a:t>Security Aspects Considered in Game</a:t>
+              <a:t>Security Aspects Considered in Game Client</a:t>
             </a:r>
           </a:p>
           <a:p>
@@ -6593,6 +7522,108 @@
     <p:extLst>
       <p:ext uri="{BB962C8B-B14F-4D97-AF65-F5344CB8AC3E}">
         <p14:creationId xmlns:p14="http://schemas.microsoft.com/office/powerpoint/2010/main" val="3529114326"/>
+      </p:ext>
+    </p:extLst>
+  </p:cSld>
+  <p:clrMapOvr>
+    <a:masterClrMapping/>
+  </p:clrMapOvr>
+  <mc:AlternateContent xmlns:mc="http://schemas.openxmlformats.org/markup-compatibility/2006" xmlns:p14="http://schemas.microsoft.com/office/powerpoint/2010/main">
+    <mc:Choice Requires="p14">
+      <p:transition spd="med" p14:dur="700">
+        <p:fade/>
+      </p:transition>
+    </mc:Choice>
+    <mc:Fallback xmlns="">
+      <p:transition spd="med">
+        <p:fade/>
+      </p:transition>
+    </mc:Fallback>
+  </mc:AlternateContent>
+</p:sld>
+</file>
+
+<file path=ppt/slides/slide20.xml><?xml version="1.0" encoding="utf-8"?>
+<p:sld xmlns:a="http://schemas.openxmlformats.org/drawingml/2006/main" xmlns:r="http://schemas.openxmlformats.org/officeDocument/2006/relationships" xmlns:p="http://schemas.openxmlformats.org/presentationml/2006/main">
+  <p:cSld>
+    <p:spTree>
+      <p:nvGrpSpPr>
+        <p:cNvPr id="1" name=""/>
+        <p:cNvGrpSpPr/>
+        <p:nvPr/>
+      </p:nvGrpSpPr>
+      <p:grpSpPr>
+        <a:xfrm>
+          <a:off x="0" y="0"/>
+          <a:ext cx="0" cy="0"/>
+          <a:chOff x="0" y="0"/>
+          <a:chExt cx="0" cy="0"/>
+        </a:xfrm>
+      </p:grpSpPr>
+      <p:sp>
+        <p:nvSpPr>
+          <p:cNvPr id="2" name="Title 1"/>
+          <p:cNvSpPr>
+            <a:spLocks noGrp="1"/>
+          </p:cNvSpPr>
+          <p:nvPr>
+            <p:ph type="title"/>
+          </p:nvPr>
+        </p:nvSpPr>
+        <p:spPr/>
+        <p:txBody>
+          <a:bodyPr/>
+          <a:lstStyle/>
+          <a:p>
+            <a:r>
+              <a:rPr lang="en-US" dirty="0"/>
+              <a:t>Add a Slide Title - 4</a:t>
+            </a:r>
+          </a:p>
+        </p:txBody>
+      </p:sp>
+      <p:sp>
+        <p:nvSpPr>
+          <p:cNvPr id="4" name="Text Placeholder 3"/>
+          <p:cNvSpPr>
+            <a:spLocks noGrp="1"/>
+          </p:cNvSpPr>
+          <p:nvPr>
+            <p:ph type="body" sz="half" idx="2"/>
+          </p:nvPr>
+        </p:nvSpPr>
+        <p:spPr/>
+        <p:txBody>
+          <a:bodyPr/>
+          <a:lstStyle/>
+          <a:p>
+            <a:endParaRPr lang="en-US" dirty="0"/>
+          </a:p>
+        </p:txBody>
+      </p:sp>
+      <p:sp>
+        <p:nvSpPr>
+          <p:cNvPr id="3" name="Content Placeholder 2"/>
+          <p:cNvSpPr>
+            <a:spLocks noGrp="1"/>
+          </p:cNvSpPr>
+          <p:nvPr>
+            <p:ph idx="1"/>
+          </p:nvPr>
+        </p:nvSpPr>
+        <p:spPr/>
+        <p:txBody>
+          <a:bodyPr/>
+          <a:lstStyle/>
+          <a:p>
+            <a:endParaRPr lang="en-US" dirty="0"/>
+          </a:p>
+        </p:txBody>
+      </p:sp>
+    </p:spTree>
+    <p:extLst>
+      <p:ext uri="{BB962C8B-B14F-4D97-AF65-F5344CB8AC3E}">
+        <p14:creationId xmlns:p14="http://schemas.microsoft.com/office/powerpoint/2010/main" val="2319046984"/>
       </p:ext>
     </p:extLst>
   </p:cSld>
@@ -6650,34 +7681,6 @@
               <a:rPr lang="en-US" dirty="0"/>
               <a:t>Demo</a:t>
             </a:r>
-          </a:p>
-        </p:txBody>
-      </p:sp>
-      <p:sp>
-        <p:nvSpPr>
-          <p:cNvPr id="5" name="Text Placeholder 4"/>
-          <p:cNvSpPr>
-            <a:spLocks noGrp="1"/>
-          </p:cNvSpPr>
-          <p:nvPr>
-            <p:ph type="body" idx="1"/>
-          </p:nvPr>
-        </p:nvSpPr>
-        <p:spPr/>
-        <p:txBody>
-          <a:bodyPr/>
-          <a:lstStyle/>
-          <a:p>
-            <a:r>
-              <a:rPr lang="en-US" sz="2800" kern="100" dirty="0">
-                <a:effectLst/>
-                <a:latin typeface="Cambria" panose="02040503050406030204" pitchFamily="18" charset="0"/>
-                <a:ea typeface="Cambria" panose="02040503050406030204" pitchFamily="18" charset="0"/>
-                <a:cs typeface="Cambria" panose="02040503050406030204" pitchFamily="18" charset="0"/>
-              </a:rPr>
-              <a:t>Md Sakib Hasan</a:t>
-            </a:r>
-            <a:endParaRPr lang="en-US" dirty="0"/>
           </a:p>
         </p:txBody>
       </p:sp>
@@ -10696,151 +11699,6 @@
 </file>
 
 <file path=customXml/item1.xml><?xml version="1.0" encoding="utf-8"?>
-<?mso-contentType ?>
-<FormTemplates xmlns="http://schemas.microsoft.com/sharepoint/v3/contenttype/forms">
-  <Display>DocumentLibraryForm</Display>
-  <Edit>AssetEditForm</Edit>
-  <New>DocumentLibraryForm</New>
-</FormTemplates>
-</file>
-
-<file path=customXml/item2.xml><?xml version="1.0" encoding="utf-8"?>
-<p:properties xmlns:p="http://schemas.microsoft.com/office/2006/metadata/properties" xmlns:xsi="http://www.w3.org/2001/XMLSchema-instance" xmlns:pc="http://schemas.microsoft.com/office/infopath/2007/PartnerControls">
-  <documentManagement>
-    <LocPublishedLinkedAssetsLookup xmlns="4873beb7-5857-4685-be1f-d57550cc96cc" xsi:nil="true"/>
-    <ApprovalStatus xmlns="4873beb7-5857-4685-be1f-d57550cc96cc">InProgress</ApprovalStatus>
-    <MarketSpecific xmlns="4873beb7-5857-4685-be1f-d57550cc96cc">false</MarketSpecific>
-    <LocComments xmlns="4873beb7-5857-4685-be1f-d57550cc96cc" xsi:nil="true"/>
-    <LocLastLocAttemptVersionTypeLookup xmlns="4873beb7-5857-4685-be1f-d57550cc96cc" xsi:nil="true"/>
-    <DirectSourceMarket xmlns="4873beb7-5857-4685-be1f-d57550cc96cc" xsi:nil="true"/>
-    <ThumbnailAssetId xmlns="4873beb7-5857-4685-be1f-d57550cc96cc" xsi:nil="true"/>
-    <PrimaryImageGen xmlns="4873beb7-5857-4685-be1f-d57550cc96cc">false</PrimaryImageGen>
-    <LocNewPublishedVersionLookup xmlns="4873beb7-5857-4685-be1f-d57550cc96cc" xsi:nil="true"/>
-    <LegacyData xmlns="4873beb7-5857-4685-be1f-d57550cc96cc" xsi:nil="true"/>
-    <LocRecommendedHandoff xmlns="4873beb7-5857-4685-be1f-d57550cc96cc" xsi:nil="true"/>
-    <BusinessGroup xmlns="4873beb7-5857-4685-be1f-d57550cc96cc" xsi:nil="true"/>
-    <BlockPublish xmlns="4873beb7-5857-4685-be1f-d57550cc96cc">false</BlockPublish>
-    <TPFriendlyName xmlns="4873beb7-5857-4685-be1f-d57550cc96cc" xsi:nil="true"/>
-    <LocOverallPublishStatusLookup xmlns="4873beb7-5857-4685-be1f-d57550cc96cc" xsi:nil="true"/>
-    <NumericId xmlns="4873beb7-5857-4685-be1f-d57550cc96cc" xsi:nil="true"/>
-    <APEditor xmlns="4873beb7-5857-4685-be1f-d57550cc96cc">
-      <UserInfo>
-        <DisplayName/>
-        <AccountId xsi:nil="true"/>
-        <AccountType/>
-      </UserInfo>
-    </APEditor>
-    <SourceTitle xmlns="4873beb7-5857-4685-be1f-d57550cc96cc" xsi:nil="true"/>
-    <OpenTemplate xmlns="4873beb7-5857-4685-be1f-d57550cc96cc">true</OpenTemplate>
-    <LocOverallLocStatusLookup xmlns="4873beb7-5857-4685-be1f-d57550cc96cc" xsi:nil="true"/>
-    <UALocComments xmlns="4873beb7-5857-4685-be1f-d57550cc96cc" xsi:nil="true"/>
-    <ParentAssetId xmlns="4873beb7-5857-4685-be1f-d57550cc96cc" xsi:nil="true"/>
-    <IntlLangReviewDate xmlns="4873beb7-5857-4685-be1f-d57550cc96cc" xsi:nil="true"/>
-    <FeatureTagsTaxHTField0 xmlns="4873beb7-5857-4685-be1f-d57550cc96cc">
-      <Terms xmlns="http://schemas.microsoft.com/office/infopath/2007/PartnerControls"/>
-    </FeatureTagsTaxHTField0>
-    <PublishStatusLookup xmlns="4873beb7-5857-4685-be1f-d57550cc96cc">
-      <Value>1345093</Value>
-    </PublishStatusLookup>
-    <Providers xmlns="4873beb7-5857-4685-be1f-d57550cc96cc" xsi:nil="true"/>
-    <MachineTranslated xmlns="4873beb7-5857-4685-be1f-d57550cc96cc">false</MachineTranslated>
-    <OriginalSourceMarket xmlns="4873beb7-5857-4685-be1f-d57550cc96cc" xsi:nil="true"/>
-    <APDescription xmlns="4873beb7-5857-4685-be1f-d57550cc96cc">This simple template design works for technology and  businesses, but it's versatile enough to use in other contexts.  It features multiple slide layouts designed for widescreen (16x9 resolution) and includes a sample SmartArt list and chart that are easily editable.</APDescription>
-    <ClipArtFilename xmlns="4873beb7-5857-4685-be1f-d57550cc96cc" xsi:nil="true"/>
-    <ContentItem xmlns="4873beb7-5857-4685-be1f-d57550cc96cc" xsi:nil="true"/>
-    <TPInstallLocation xmlns="4873beb7-5857-4685-be1f-d57550cc96cc" xsi:nil="true"/>
-    <PublishTargets xmlns="4873beb7-5857-4685-be1f-d57550cc96cc">OfficeOnlineVNext</PublishTargets>
-    <TimesCloned xmlns="4873beb7-5857-4685-be1f-d57550cc96cc" xsi:nil="true"/>
-    <AssetStart xmlns="4873beb7-5857-4685-be1f-d57550cc96cc">2011-11-26T00:30:00+00:00</AssetStart>
-    <Provider xmlns="4873beb7-5857-4685-be1f-d57550cc96cc" xsi:nil="true"/>
-    <AcquiredFrom xmlns="4873beb7-5857-4685-be1f-d57550cc96cc">Internal MS</AcquiredFrom>
-    <FriendlyTitle xmlns="4873beb7-5857-4685-be1f-d57550cc96cc" xsi:nil="true"/>
-    <LastHandOff xmlns="4873beb7-5857-4685-be1f-d57550cc96cc" xsi:nil="true"/>
-    <TPClientViewer xmlns="4873beb7-5857-4685-be1f-d57550cc96cc" xsi:nil="true"/>
-    <TemplateStatus xmlns="4873beb7-5857-4685-be1f-d57550cc96cc">Complete</TemplateStatus>
-    <Downloads xmlns="4873beb7-5857-4685-be1f-d57550cc96cc">0</Downloads>
-    <OOCacheId xmlns="4873beb7-5857-4685-be1f-d57550cc96cc" xsi:nil="true"/>
-    <IsDeleted xmlns="4873beb7-5857-4685-be1f-d57550cc96cc">false</IsDeleted>
-    <LocPublishedDependentAssetsLookup xmlns="4873beb7-5857-4685-be1f-d57550cc96cc" xsi:nil="true"/>
-    <TPExecutable xmlns="4873beb7-5857-4685-be1f-d57550cc96cc" xsi:nil="true"/>
-    <EditorialTags xmlns="4873beb7-5857-4685-be1f-d57550cc96cc" xsi:nil="true"/>
-    <SubmitterId xmlns="4873beb7-5857-4685-be1f-d57550cc96cc" xsi:nil="true"/>
-    <ApprovalLog xmlns="4873beb7-5857-4685-be1f-d57550cc96cc" xsi:nil="true"/>
-    <AssetType xmlns="4873beb7-5857-4685-be1f-d57550cc96cc">TP</AssetType>
-    <BugNumber xmlns="4873beb7-5857-4685-be1f-d57550cc96cc" xsi:nil="true"/>
-    <CSXSubmissionDate xmlns="4873beb7-5857-4685-be1f-d57550cc96cc" xsi:nil="true"/>
-    <CSXUpdate xmlns="4873beb7-5857-4685-be1f-d57550cc96cc">false</CSXUpdate>
-    <Milestone xmlns="4873beb7-5857-4685-be1f-d57550cc96cc" xsi:nil="true"/>
-    <RecommendationsModifier xmlns="4873beb7-5857-4685-be1f-d57550cc96cc" xsi:nil="true"/>
-    <OriginAsset xmlns="4873beb7-5857-4685-be1f-d57550cc96cc" xsi:nil="true"/>
-    <TPComponent xmlns="4873beb7-5857-4685-be1f-d57550cc96cc" xsi:nil="true"/>
-    <AssetId xmlns="4873beb7-5857-4685-be1f-d57550cc96cc">TP102787989</AssetId>
-    <IntlLocPriority xmlns="4873beb7-5857-4685-be1f-d57550cc96cc" xsi:nil="true"/>
-    <PolicheckWords xmlns="4873beb7-5857-4685-be1f-d57550cc96cc" xsi:nil="true"/>
-    <TPLaunchHelpLink xmlns="4873beb7-5857-4685-be1f-d57550cc96cc" xsi:nil="true"/>
-    <TPApplication xmlns="4873beb7-5857-4685-be1f-d57550cc96cc" xsi:nil="true"/>
-    <CrawlForDependencies xmlns="4873beb7-5857-4685-be1f-d57550cc96cc">false</CrawlForDependencies>
-    <HandoffToMSDN xmlns="4873beb7-5857-4685-be1f-d57550cc96cc" xsi:nil="true"/>
-    <PlannedPubDate xmlns="4873beb7-5857-4685-be1f-d57550cc96cc" xsi:nil="true"/>
-    <IntlLangReviewer xmlns="4873beb7-5857-4685-be1f-d57550cc96cc" xsi:nil="true"/>
-    <TrustLevel xmlns="4873beb7-5857-4685-be1f-d57550cc96cc">1 Microsoft Managed Content</TrustLevel>
-    <LocLastLocAttemptVersionLookup xmlns="4873beb7-5857-4685-be1f-d57550cc96cc">694266</LocLastLocAttemptVersionLookup>
-    <LocProcessedForHandoffsLookup xmlns="4873beb7-5857-4685-be1f-d57550cc96cc" xsi:nil="true"/>
-    <IsSearchable xmlns="4873beb7-5857-4685-be1f-d57550cc96cc">true</IsSearchable>
-    <TemplateTemplateType xmlns="4873beb7-5857-4685-be1f-d57550cc96cc">PowerPoint Presentation Template</TemplateTemplateType>
-    <CampaignTagsTaxHTField0 xmlns="4873beb7-5857-4685-be1f-d57550cc96cc">
-      <Terms xmlns="http://schemas.microsoft.com/office/infopath/2007/PartnerControls"/>
-    </CampaignTagsTaxHTField0>
-    <TPNamespace xmlns="4873beb7-5857-4685-be1f-d57550cc96cc" xsi:nil="true"/>
-    <LocOverallPreviewStatusLookup xmlns="4873beb7-5857-4685-be1f-d57550cc96cc" xsi:nil="true"/>
-    <TaxCatchAll xmlns="4873beb7-5857-4685-be1f-d57550cc96cc"/>
-    <Markets xmlns="4873beb7-5857-4685-be1f-d57550cc96cc"/>
-    <UAProjectedTotalWords xmlns="4873beb7-5857-4685-be1f-d57550cc96cc" xsi:nil="true"/>
-    <IntlLangReview xmlns="4873beb7-5857-4685-be1f-d57550cc96cc" xsi:nil="true"/>
-    <OutputCachingOn xmlns="4873beb7-5857-4685-be1f-d57550cc96cc">false</OutputCachingOn>
-    <AverageRating xmlns="4873beb7-5857-4685-be1f-d57550cc96cc" xsi:nil="true"/>
-    <APAuthor xmlns="4873beb7-5857-4685-be1f-d57550cc96cc">
-      <UserInfo>
-        <DisplayName>REDMOND\kristaa</DisplayName>
-        <AccountId>136</AccountId>
-        <AccountType/>
-      </UserInfo>
-    </APAuthor>
-    <LocManualTestRequired xmlns="4873beb7-5857-4685-be1f-d57550cc96cc">false</LocManualTestRequired>
-    <TPCommandLine xmlns="4873beb7-5857-4685-be1f-d57550cc96cc" xsi:nil="true"/>
-    <TPAppVersion xmlns="4873beb7-5857-4685-be1f-d57550cc96cc" xsi:nil="true"/>
-    <EditorialStatus xmlns="4873beb7-5857-4685-be1f-d57550cc96cc">Complete</EditorialStatus>
-    <LastModifiedDateTime xmlns="4873beb7-5857-4685-be1f-d57550cc96cc" xsi:nil="true"/>
-    <ScenarioTagsTaxHTField0 xmlns="4873beb7-5857-4685-be1f-d57550cc96cc">
-      <Terms xmlns="http://schemas.microsoft.com/office/infopath/2007/PartnerControls"/>
-    </ScenarioTagsTaxHTField0>
-    <LocProcessedForMarketsLookup xmlns="4873beb7-5857-4685-be1f-d57550cc96cc" xsi:nil="true"/>
-    <TPLaunchHelpLinkType xmlns="4873beb7-5857-4685-be1f-d57550cc96cc">Template</TPLaunchHelpLinkType>
-    <OriginalRelease xmlns="4873beb7-5857-4685-be1f-d57550cc96cc">15</OriginalRelease>
-    <LocalizationTagsTaxHTField0 xmlns="4873beb7-5857-4685-be1f-d57550cc96cc">
-      <Terms xmlns="http://schemas.microsoft.com/office/infopath/2007/PartnerControls"/>
-    </LocalizationTagsTaxHTField0>
-    <UACurrentWords xmlns="4873beb7-5857-4685-be1f-d57550cc96cc" xsi:nil="true"/>
-    <ArtSampleDocs xmlns="4873beb7-5857-4685-be1f-d57550cc96cc" xsi:nil="true"/>
-    <UALocRecommendation xmlns="4873beb7-5857-4685-be1f-d57550cc96cc">Localize</UALocRecommendation>
-    <Manager xmlns="4873beb7-5857-4685-be1f-d57550cc96cc" xsi:nil="true"/>
-    <LocOverallHandbackStatusLookup xmlns="4873beb7-5857-4685-be1f-d57550cc96cc" xsi:nil="true"/>
-    <ShowIn xmlns="4873beb7-5857-4685-be1f-d57550cc96cc">Show everywhere</ShowIn>
-    <UANotes xmlns="4873beb7-5857-4685-be1f-d57550cc96cc" xsi:nil="true"/>
-    <InternalTagsTaxHTField0 xmlns="4873beb7-5857-4685-be1f-d57550cc96cc">
-      <Terms xmlns="http://schemas.microsoft.com/office/infopath/2007/PartnerControls"/>
-    </InternalTagsTaxHTField0>
-    <CSXHash xmlns="4873beb7-5857-4685-be1f-d57550cc96cc" xsi:nil="true"/>
-    <VoteCount xmlns="4873beb7-5857-4685-be1f-d57550cc96cc" xsi:nil="true"/>
-    <AssetExpire xmlns="4873beb7-5857-4685-be1f-d57550cc96cc">2029-05-12T07:00:00+00:00</AssetExpire>
-    <DSATActionTaken xmlns="4873beb7-5857-4685-be1f-d57550cc96cc" xsi:nil="true"/>
-    <CSXSubmissionMarket xmlns="4873beb7-5857-4685-be1f-d57550cc96cc" xsi:nil="true"/>
-    <LocMarketGroupTiers2 xmlns="4873beb7-5857-4685-be1f-d57550cc96cc" xsi:nil="true"/>
-  </documentManagement>
-</p:properties>
-</file>
-
-<file path=customXml/item3.xml><?xml version="1.0" encoding="utf-8"?>
 <ct:contentTypeSchema xmlns:ct="http://schemas.microsoft.com/office/2006/metadata/contentType" xmlns:ma="http://schemas.microsoft.com/office/2006/metadata/properties/metaAttributes" ct:_="" ma:_="" ma:contentTypeName="TemplateFile" ma:contentTypeID="0x0101006EDDDB5EE6D98C44930B742096920B300400F5B6D36B3EF94B4E9A635CDF2A18F5B8" ma:contentTypeVersion="72" ma:contentTypeDescription="Create a new document." ma:contentTypeScope="" ma:versionID="a23e56308344d904b51738559c3d67c9">
   <xsd:schema xmlns:xsd="http://www.w3.org/2001/XMLSchema" xmlns:xs="http://www.w3.org/2001/XMLSchema" xmlns:p="http://schemas.microsoft.com/office/2006/metadata/properties" xmlns:ns2="4873beb7-5857-4685-be1f-d57550cc96cc" targetNamespace="http://schemas.microsoft.com/office/2006/metadata/properties" ma:root="true" ma:fieldsID="cd0908cc4600e77bf5da051303e00c8d" ns2:_="">
     <xsd:import namespace="4873beb7-5857-4685-be1f-d57550cc96cc"/>
@@ -11880,10 +12738,165 @@
 </ct:contentTypeSchema>
 </file>
 
+<file path=customXml/item2.xml><?xml version="1.0" encoding="utf-8"?>
+<p:properties xmlns:p="http://schemas.microsoft.com/office/2006/metadata/properties" xmlns:xsi="http://www.w3.org/2001/XMLSchema-instance" xmlns:pc="http://schemas.microsoft.com/office/infopath/2007/PartnerControls">
+  <documentManagement>
+    <LocPublishedLinkedAssetsLookup xmlns="4873beb7-5857-4685-be1f-d57550cc96cc" xsi:nil="true"/>
+    <ApprovalStatus xmlns="4873beb7-5857-4685-be1f-d57550cc96cc">InProgress</ApprovalStatus>
+    <MarketSpecific xmlns="4873beb7-5857-4685-be1f-d57550cc96cc">false</MarketSpecific>
+    <LocComments xmlns="4873beb7-5857-4685-be1f-d57550cc96cc" xsi:nil="true"/>
+    <LocLastLocAttemptVersionTypeLookup xmlns="4873beb7-5857-4685-be1f-d57550cc96cc" xsi:nil="true"/>
+    <DirectSourceMarket xmlns="4873beb7-5857-4685-be1f-d57550cc96cc" xsi:nil="true"/>
+    <ThumbnailAssetId xmlns="4873beb7-5857-4685-be1f-d57550cc96cc" xsi:nil="true"/>
+    <PrimaryImageGen xmlns="4873beb7-5857-4685-be1f-d57550cc96cc">false</PrimaryImageGen>
+    <LocNewPublishedVersionLookup xmlns="4873beb7-5857-4685-be1f-d57550cc96cc" xsi:nil="true"/>
+    <LegacyData xmlns="4873beb7-5857-4685-be1f-d57550cc96cc" xsi:nil="true"/>
+    <LocRecommendedHandoff xmlns="4873beb7-5857-4685-be1f-d57550cc96cc" xsi:nil="true"/>
+    <BusinessGroup xmlns="4873beb7-5857-4685-be1f-d57550cc96cc" xsi:nil="true"/>
+    <BlockPublish xmlns="4873beb7-5857-4685-be1f-d57550cc96cc">false</BlockPublish>
+    <TPFriendlyName xmlns="4873beb7-5857-4685-be1f-d57550cc96cc" xsi:nil="true"/>
+    <LocOverallPublishStatusLookup xmlns="4873beb7-5857-4685-be1f-d57550cc96cc" xsi:nil="true"/>
+    <NumericId xmlns="4873beb7-5857-4685-be1f-d57550cc96cc" xsi:nil="true"/>
+    <APEditor xmlns="4873beb7-5857-4685-be1f-d57550cc96cc">
+      <UserInfo>
+        <DisplayName/>
+        <AccountId xsi:nil="true"/>
+        <AccountType/>
+      </UserInfo>
+    </APEditor>
+    <SourceTitle xmlns="4873beb7-5857-4685-be1f-d57550cc96cc" xsi:nil="true"/>
+    <OpenTemplate xmlns="4873beb7-5857-4685-be1f-d57550cc96cc">true</OpenTemplate>
+    <LocOverallLocStatusLookup xmlns="4873beb7-5857-4685-be1f-d57550cc96cc" xsi:nil="true"/>
+    <UALocComments xmlns="4873beb7-5857-4685-be1f-d57550cc96cc" xsi:nil="true"/>
+    <ParentAssetId xmlns="4873beb7-5857-4685-be1f-d57550cc96cc" xsi:nil="true"/>
+    <IntlLangReviewDate xmlns="4873beb7-5857-4685-be1f-d57550cc96cc" xsi:nil="true"/>
+    <FeatureTagsTaxHTField0 xmlns="4873beb7-5857-4685-be1f-d57550cc96cc">
+      <Terms xmlns="http://schemas.microsoft.com/office/infopath/2007/PartnerControls"/>
+    </FeatureTagsTaxHTField0>
+    <PublishStatusLookup xmlns="4873beb7-5857-4685-be1f-d57550cc96cc">
+      <Value>1345093</Value>
+    </PublishStatusLookup>
+    <Providers xmlns="4873beb7-5857-4685-be1f-d57550cc96cc" xsi:nil="true"/>
+    <MachineTranslated xmlns="4873beb7-5857-4685-be1f-d57550cc96cc">false</MachineTranslated>
+    <OriginalSourceMarket xmlns="4873beb7-5857-4685-be1f-d57550cc96cc" xsi:nil="true"/>
+    <APDescription xmlns="4873beb7-5857-4685-be1f-d57550cc96cc">This simple template design works for technology and  businesses, but it's versatile enough to use in other contexts.  It features multiple slide layouts designed for widescreen (16x9 resolution) and includes a sample SmartArt list and chart that are easily editable.</APDescription>
+    <ClipArtFilename xmlns="4873beb7-5857-4685-be1f-d57550cc96cc" xsi:nil="true"/>
+    <ContentItem xmlns="4873beb7-5857-4685-be1f-d57550cc96cc" xsi:nil="true"/>
+    <TPInstallLocation xmlns="4873beb7-5857-4685-be1f-d57550cc96cc" xsi:nil="true"/>
+    <PublishTargets xmlns="4873beb7-5857-4685-be1f-d57550cc96cc">OfficeOnlineVNext</PublishTargets>
+    <TimesCloned xmlns="4873beb7-5857-4685-be1f-d57550cc96cc" xsi:nil="true"/>
+    <AssetStart xmlns="4873beb7-5857-4685-be1f-d57550cc96cc">2011-11-26T00:30:00+00:00</AssetStart>
+    <Provider xmlns="4873beb7-5857-4685-be1f-d57550cc96cc" xsi:nil="true"/>
+    <AcquiredFrom xmlns="4873beb7-5857-4685-be1f-d57550cc96cc">Internal MS</AcquiredFrom>
+    <FriendlyTitle xmlns="4873beb7-5857-4685-be1f-d57550cc96cc" xsi:nil="true"/>
+    <LastHandOff xmlns="4873beb7-5857-4685-be1f-d57550cc96cc" xsi:nil="true"/>
+    <TPClientViewer xmlns="4873beb7-5857-4685-be1f-d57550cc96cc" xsi:nil="true"/>
+    <TemplateStatus xmlns="4873beb7-5857-4685-be1f-d57550cc96cc">Complete</TemplateStatus>
+    <Downloads xmlns="4873beb7-5857-4685-be1f-d57550cc96cc">0</Downloads>
+    <OOCacheId xmlns="4873beb7-5857-4685-be1f-d57550cc96cc" xsi:nil="true"/>
+    <IsDeleted xmlns="4873beb7-5857-4685-be1f-d57550cc96cc">false</IsDeleted>
+    <LocPublishedDependentAssetsLookup xmlns="4873beb7-5857-4685-be1f-d57550cc96cc" xsi:nil="true"/>
+    <TPExecutable xmlns="4873beb7-5857-4685-be1f-d57550cc96cc" xsi:nil="true"/>
+    <EditorialTags xmlns="4873beb7-5857-4685-be1f-d57550cc96cc" xsi:nil="true"/>
+    <SubmitterId xmlns="4873beb7-5857-4685-be1f-d57550cc96cc" xsi:nil="true"/>
+    <ApprovalLog xmlns="4873beb7-5857-4685-be1f-d57550cc96cc" xsi:nil="true"/>
+    <AssetType xmlns="4873beb7-5857-4685-be1f-d57550cc96cc">TP</AssetType>
+    <BugNumber xmlns="4873beb7-5857-4685-be1f-d57550cc96cc" xsi:nil="true"/>
+    <CSXSubmissionDate xmlns="4873beb7-5857-4685-be1f-d57550cc96cc" xsi:nil="true"/>
+    <CSXUpdate xmlns="4873beb7-5857-4685-be1f-d57550cc96cc">false</CSXUpdate>
+    <Milestone xmlns="4873beb7-5857-4685-be1f-d57550cc96cc" xsi:nil="true"/>
+    <RecommendationsModifier xmlns="4873beb7-5857-4685-be1f-d57550cc96cc" xsi:nil="true"/>
+    <OriginAsset xmlns="4873beb7-5857-4685-be1f-d57550cc96cc" xsi:nil="true"/>
+    <TPComponent xmlns="4873beb7-5857-4685-be1f-d57550cc96cc" xsi:nil="true"/>
+    <AssetId xmlns="4873beb7-5857-4685-be1f-d57550cc96cc">TP102787989</AssetId>
+    <IntlLocPriority xmlns="4873beb7-5857-4685-be1f-d57550cc96cc" xsi:nil="true"/>
+    <PolicheckWords xmlns="4873beb7-5857-4685-be1f-d57550cc96cc" xsi:nil="true"/>
+    <TPLaunchHelpLink xmlns="4873beb7-5857-4685-be1f-d57550cc96cc" xsi:nil="true"/>
+    <TPApplication xmlns="4873beb7-5857-4685-be1f-d57550cc96cc" xsi:nil="true"/>
+    <CrawlForDependencies xmlns="4873beb7-5857-4685-be1f-d57550cc96cc">false</CrawlForDependencies>
+    <HandoffToMSDN xmlns="4873beb7-5857-4685-be1f-d57550cc96cc" xsi:nil="true"/>
+    <PlannedPubDate xmlns="4873beb7-5857-4685-be1f-d57550cc96cc" xsi:nil="true"/>
+    <IntlLangReviewer xmlns="4873beb7-5857-4685-be1f-d57550cc96cc" xsi:nil="true"/>
+    <TrustLevel xmlns="4873beb7-5857-4685-be1f-d57550cc96cc">1 Microsoft Managed Content</TrustLevel>
+    <LocLastLocAttemptVersionLookup xmlns="4873beb7-5857-4685-be1f-d57550cc96cc">694266</LocLastLocAttemptVersionLookup>
+    <LocProcessedForHandoffsLookup xmlns="4873beb7-5857-4685-be1f-d57550cc96cc" xsi:nil="true"/>
+    <IsSearchable xmlns="4873beb7-5857-4685-be1f-d57550cc96cc">true</IsSearchable>
+    <TemplateTemplateType xmlns="4873beb7-5857-4685-be1f-d57550cc96cc">PowerPoint Presentation Template</TemplateTemplateType>
+    <CampaignTagsTaxHTField0 xmlns="4873beb7-5857-4685-be1f-d57550cc96cc">
+      <Terms xmlns="http://schemas.microsoft.com/office/infopath/2007/PartnerControls"/>
+    </CampaignTagsTaxHTField0>
+    <TPNamespace xmlns="4873beb7-5857-4685-be1f-d57550cc96cc" xsi:nil="true"/>
+    <LocOverallPreviewStatusLookup xmlns="4873beb7-5857-4685-be1f-d57550cc96cc" xsi:nil="true"/>
+    <TaxCatchAll xmlns="4873beb7-5857-4685-be1f-d57550cc96cc"/>
+    <Markets xmlns="4873beb7-5857-4685-be1f-d57550cc96cc"/>
+    <UAProjectedTotalWords xmlns="4873beb7-5857-4685-be1f-d57550cc96cc" xsi:nil="true"/>
+    <IntlLangReview xmlns="4873beb7-5857-4685-be1f-d57550cc96cc" xsi:nil="true"/>
+    <OutputCachingOn xmlns="4873beb7-5857-4685-be1f-d57550cc96cc">false</OutputCachingOn>
+    <AverageRating xmlns="4873beb7-5857-4685-be1f-d57550cc96cc" xsi:nil="true"/>
+    <APAuthor xmlns="4873beb7-5857-4685-be1f-d57550cc96cc">
+      <UserInfo>
+        <DisplayName>REDMOND\kristaa</DisplayName>
+        <AccountId>136</AccountId>
+        <AccountType/>
+      </UserInfo>
+    </APAuthor>
+    <LocManualTestRequired xmlns="4873beb7-5857-4685-be1f-d57550cc96cc">false</LocManualTestRequired>
+    <TPCommandLine xmlns="4873beb7-5857-4685-be1f-d57550cc96cc" xsi:nil="true"/>
+    <TPAppVersion xmlns="4873beb7-5857-4685-be1f-d57550cc96cc" xsi:nil="true"/>
+    <EditorialStatus xmlns="4873beb7-5857-4685-be1f-d57550cc96cc">Complete</EditorialStatus>
+    <LastModifiedDateTime xmlns="4873beb7-5857-4685-be1f-d57550cc96cc" xsi:nil="true"/>
+    <ScenarioTagsTaxHTField0 xmlns="4873beb7-5857-4685-be1f-d57550cc96cc">
+      <Terms xmlns="http://schemas.microsoft.com/office/infopath/2007/PartnerControls"/>
+    </ScenarioTagsTaxHTField0>
+    <LocProcessedForMarketsLookup xmlns="4873beb7-5857-4685-be1f-d57550cc96cc" xsi:nil="true"/>
+    <TPLaunchHelpLinkType xmlns="4873beb7-5857-4685-be1f-d57550cc96cc">Template</TPLaunchHelpLinkType>
+    <OriginalRelease xmlns="4873beb7-5857-4685-be1f-d57550cc96cc">15</OriginalRelease>
+    <LocalizationTagsTaxHTField0 xmlns="4873beb7-5857-4685-be1f-d57550cc96cc">
+      <Terms xmlns="http://schemas.microsoft.com/office/infopath/2007/PartnerControls"/>
+    </LocalizationTagsTaxHTField0>
+    <UACurrentWords xmlns="4873beb7-5857-4685-be1f-d57550cc96cc" xsi:nil="true"/>
+    <ArtSampleDocs xmlns="4873beb7-5857-4685-be1f-d57550cc96cc" xsi:nil="true"/>
+    <UALocRecommendation xmlns="4873beb7-5857-4685-be1f-d57550cc96cc">Localize</UALocRecommendation>
+    <Manager xmlns="4873beb7-5857-4685-be1f-d57550cc96cc" xsi:nil="true"/>
+    <LocOverallHandbackStatusLookup xmlns="4873beb7-5857-4685-be1f-d57550cc96cc" xsi:nil="true"/>
+    <ShowIn xmlns="4873beb7-5857-4685-be1f-d57550cc96cc">Show everywhere</ShowIn>
+    <UANotes xmlns="4873beb7-5857-4685-be1f-d57550cc96cc" xsi:nil="true"/>
+    <InternalTagsTaxHTField0 xmlns="4873beb7-5857-4685-be1f-d57550cc96cc">
+      <Terms xmlns="http://schemas.microsoft.com/office/infopath/2007/PartnerControls"/>
+    </InternalTagsTaxHTField0>
+    <CSXHash xmlns="4873beb7-5857-4685-be1f-d57550cc96cc" xsi:nil="true"/>
+    <VoteCount xmlns="4873beb7-5857-4685-be1f-d57550cc96cc" xsi:nil="true"/>
+    <AssetExpire xmlns="4873beb7-5857-4685-be1f-d57550cc96cc">2029-05-12T07:00:00+00:00</AssetExpire>
+    <DSATActionTaken xmlns="4873beb7-5857-4685-be1f-d57550cc96cc" xsi:nil="true"/>
+    <CSXSubmissionMarket xmlns="4873beb7-5857-4685-be1f-d57550cc96cc" xsi:nil="true"/>
+    <LocMarketGroupTiers2 xmlns="4873beb7-5857-4685-be1f-d57550cc96cc" xsi:nil="true"/>
+  </documentManagement>
+</p:properties>
+</file>
+
+<file path=customXml/item3.xml><?xml version="1.0" encoding="utf-8"?>
+<?mso-contentType ?>
+<FormTemplates xmlns="http://schemas.microsoft.com/sharepoint/v3/contenttype/forms">
+  <Display>DocumentLibraryForm</Display>
+  <Edit>AssetEditForm</Edit>
+  <New>DocumentLibraryForm</New>
+</FormTemplates>
+</file>
+
 <file path=customXml/itemProps1.xml><?xml version="1.0" encoding="utf-8"?>
-<ds:datastoreItem xmlns:ds="http://schemas.openxmlformats.org/officeDocument/2006/customXml" ds:itemID="{3836F65B-1B07-41EE-A0E8-BC6EF3855225}">
+<ds:datastoreItem xmlns:ds="http://schemas.openxmlformats.org/officeDocument/2006/customXml" ds:itemID="{A09BF4D4-EF60-4196-BFC3-9462D607978C}">
   <ds:schemaRefs>
-    <ds:schemaRef ds:uri="http://schemas.microsoft.com/sharepoint/v3/contenttype/forms"/>
+    <ds:schemaRef ds:uri="http://schemas.microsoft.com/office/2006/metadata/contentType"/>
+    <ds:schemaRef ds:uri="http://schemas.microsoft.com/office/2006/metadata/properties/metaAttributes"/>
+    <ds:schemaRef ds:uri="http://www.w3.org/2001/XMLSchema"/>
+    <ds:schemaRef ds:uri="http://schemas.microsoft.com/office/2006/metadata/properties"/>
+    <ds:schemaRef ds:uri="4873beb7-5857-4685-be1f-d57550cc96cc"/>
+    <ds:schemaRef ds:uri="http://schemas.microsoft.com/office/2006/documentManagement/types"/>
+    <ds:schemaRef ds:uri="http://schemas.microsoft.com/office/infopath/2007/PartnerControls"/>
+    <ds:schemaRef ds:uri="http://schemas.openxmlformats.org/package/2006/metadata/core-properties"/>
+    <ds:schemaRef ds:uri="http://purl.org/dc/elements/1.1/"/>
+    <ds:schemaRef ds:uri="http://purl.org/dc/terms/"/>
+    <ds:schemaRef ds:uri="http://schemas.microsoft.com/internal/obd"/>
   </ds:schemaRefs>
 </ds:datastoreItem>
 </file>
@@ -11905,19 +12918,9 @@
 </file>
 
 <file path=customXml/itemProps3.xml><?xml version="1.0" encoding="utf-8"?>
-<ds:datastoreItem xmlns:ds="http://schemas.openxmlformats.org/officeDocument/2006/customXml" ds:itemID="{A09BF4D4-EF60-4196-BFC3-9462D607978C}">
+<ds:datastoreItem xmlns:ds="http://schemas.openxmlformats.org/officeDocument/2006/customXml" ds:itemID="{3836F65B-1B07-41EE-A0E8-BC6EF3855225}">
   <ds:schemaRefs>
-    <ds:schemaRef ds:uri="http://schemas.microsoft.com/office/2006/metadata/contentType"/>
-    <ds:schemaRef ds:uri="http://schemas.microsoft.com/office/2006/metadata/properties/metaAttributes"/>
-    <ds:schemaRef ds:uri="http://www.w3.org/2001/XMLSchema"/>
-    <ds:schemaRef ds:uri="http://schemas.microsoft.com/office/2006/metadata/properties"/>
-    <ds:schemaRef ds:uri="4873beb7-5857-4685-be1f-d57550cc96cc"/>
-    <ds:schemaRef ds:uri="http://schemas.microsoft.com/office/2006/documentManagement/types"/>
-    <ds:schemaRef ds:uri="http://schemas.microsoft.com/office/infopath/2007/PartnerControls"/>
-    <ds:schemaRef ds:uri="http://schemas.openxmlformats.org/package/2006/metadata/core-properties"/>
-    <ds:schemaRef ds:uri="http://purl.org/dc/elements/1.1/"/>
-    <ds:schemaRef ds:uri="http://purl.org/dc/terms/"/>
-    <ds:schemaRef ds:uri="http://schemas.microsoft.com/internal/obd"/>
+    <ds:schemaRef ds:uri="http://schemas.microsoft.com/sharepoint/v3/contenttype/forms"/>
   </ds:schemaRefs>
 </ds:datastoreItem>
 </file>
</xml_diff>